<commit_message>
added level switches & and first level
</commit_message>
<xml_diff>
--- a/prog_proj3/Prototyp_Abdel-Kader.pptx
+++ b/prog_proj3/Prototyp_Abdel-Kader.pptx
@@ -268,7 +268,7 @@
           <a:p>
             <a:fld id="{A11D1266-B88A-4790-A260-5FB966F0A26F}" type="datetimeFigureOut">
               <a:rPr lang="de-DE" smtClean="0"/>
-              <a:t>15.10.2021</a:t>
+              <a:t>16.10.2021</a:t>
             </a:fld>
             <a:endParaRPr lang="de-DE"/>
           </a:p>
@@ -466,7 +466,7 @@
           <a:p>
             <a:fld id="{A11D1266-B88A-4790-A260-5FB966F0A26F}" type="datetimeFigureOut">
               <a:rPr lang="de-DE" smtClean="0"/>
-              <a:t>15.10.2021</a:t>
+              <a:t>16.10.2021</a:t>
             </a:fld>
             <a:endParaRPr lang="de-DE"/>
           </a:p>
@@ -674,7 +674,7 @@
           <a:p>
             <a:fld id="{A11D1266-B88A-4790-A260-5FB966F0A26F}" type="datetimeFigureOut">
               <a:rPr lang="de-DE" smtClean="0"/>
-              <a:t>15.10.2021</a:t>
+              <a:t>16.10.2021</a:t>
             </a:fld>
             <a:endParaRPr lang="de-DE"/>
           </a:p>
@@ -872,7 +872,7 @@
           <a:p>
             <a:fld id="{A11D1266-B88A-4790-A260-5FB966F0A26F}" type="datetimeFigureOut">
               <a:rPr lang="de-DE" smtClean="0"/>
-              <a:t>15.10.2021</a:t>
+              <a:t>16.10.2021</a:t>
             </a:fld>
             <a:endParaRPr lang="de-DE"/>
           </a:p>
@@ -1147,7 +1147,7 @@
           <a:p>
             <a:fld id="{A11D1266-B88A-4790-A260-5FB966F0A26F}" type="datetimeFigureOut">
               <a:rPr lang="de-DE" smtClean="0"/>
-              <a:t>15.10.2021</a:t>
+              <a:t>16.10.2021</a:t>
             </a:fld>
             <a:endParaRPr lang="de-DE"/>
           </a:p>
@@ -1412,7 +1412,7 @@
           <a:p>
             <a:fld id="{A11D1266-B88A-4790-A260-5FB966F0A26F}" type="datetimeFigureOut">
               <a:rPr lang="de-DE" smtClean="0"/>
-              <a:t>15.10.2021</a:t>
+              <a:t>16.10.2021</a:t>
             </a:fld>
             <a:endParaRPr lang="de-DE"/>
           </a:p>
@@ -1824,7 +1824,7 @@
           <a:p>
             <a:fld id="{A11D1266-B88A-4790-A260-5FB966F0A26F}" type="datetimeFigureOut">
               <a:rPr lang="de-DE" smtClean="0"/>
-              <a:t>15.10.2021</a:t>
+              <a:t>16.10.2021</a:t>
             </a:fld>
             <a:endParaRPr lang="de-DE"/>
           </a:p>
@@ -1965,7 +1965,7 @@
           <a:p>
             <a:fld id="{A11D1266-B88A-4790-A260-5FB966F0A26F}" type="datetimeFigureOut">
               <a:rPr lang="de-DE" smtClean="0"/>
-              <a:t>15.10.2021</a:t>
+              <a:t>16.10.2021</a:t>
             </a:fld>
             <a:endParaRPr lang="de-DE"/>
           </a:p>
@@ -2078,7 +2078,7 @@
           <a:p>
             <a:fld id="{A11D1266-B88A-4790-A260-5FB966F0A26F}" type="datetimeFigureOut">
               <a:rPr lang="de-DE" smtClean="0"/>
-              <a:t>15.10.2021</a:t>
+              <a:t>16.10.2021</a:t>
             </a:fld>
             <a:endParaRPr lang="de-DE"/>
           </a:p>
@@ -2389,7 +2389,7 @@
           <a:p>
             <a:fld id="{A11D1266-B88A-4790-A260-5FB966F0A26F}" type="datetimeFigureOut">
               <a:rPr lang="de-DE" smtClean="0"/>
-              <a:t>15.10.2021</a:t>
+              <a:t>16.10.2021</a:t>
             </a:fld>
             <a:endParaRPr lang="de-DE"/>
           </a:p>
@@ -2677,7 +2677,7 @@
           <a:p>
             <a:fld id="{A11D1266-B88A-4790-A260-5FB966F0A26F}" type="datetimeFigureOut">
               <a:rPr lang="de-DE" smtClean="0"/>
-              <a:t>15.10.2021</a:t>
+              <a:t>16.10.2021</a:t>
             </a:fld>
             <a:endParaRPr lang="de-DE"/>
           </a:p>
@@ -2918,7 +2918,7 @@
           <a:p>
             <a:fld id="{A11D1266-B88A-4790-A260-5FB966F0A26F}" type="datetimeFigureOut">
               <a:rPr lang="de-DE" smtClean="0"/>
-              <a:t>15.10.2021</a:t>
+              <a:t>16.10.2021</a:t>
             </a:fld>
             <a:endParaRPr lang="de-DE"/>
           </a:p>
@@ -3413,7 +3413,7 @@
         </p:nvSpPr>
         <p:spPr>
           <a:xfrm>
-            <a:off x="1978926" y="3029801"/>
+            <a:off x="1661426" y="2001101"/>
             <a:ext cx="8570793" cy="996287"/>
           </a:xfrm>
           <a:prstGeom prst="wedgeEllipseCallout">
@@ -3511,6 +3511,132 @@
           </a:p>
         </p:txBody>
       </p:sp>
+      <p:grpSp>
+        <p:nvGrpSpPr>
+          <p:cNvPr id="10" name="Gruppieren 9">
+            <a:extLst>
+              <a:ext uri="{FF2B5EF4-FFF2-40B4-BE49-F238E27FC236}">
+                <a16:creationId xmlns:a16="http://schemas.microsoft.com/office/drawing/2014/main" id="{3079E4FF-BA5F-4F7D-84A6-9D27A04400B8}"/>
+              </a:ext>
+            </a:extLst>
+          </p:cNvPr>
+          <p:cNvGrpSpPr/>
+          <p:nvPr/>
+        </p:nvGrpSpPr>
+        <p:grpSpPr>
+          <a:xfrm>
+            <a:off x="2282019" y="3710129"/>
+            <a:ext cx="8089900" cy="1484171"/>
+            <a:chOff x="2459819" y="4472129"/>
+            <a:chExt cx="8089900" cy="1484171"/>
+          </a:xfrm>
+        </p:grpSpPr>
+        <p:pic>
+          <p:nvPicPr>
+            <p:cNvPr id="1026" name="Picture 2">
+              <a:extLst>
+                <a:ext uri="{FF2B5EF4-FFF2-40B4-BE49-F238E27FC236}">
+                  <a16:creationId xmlns:a16="http://schemas.microsoft.com/office/drawing/2014/main" id="{9B1F0E50-4533-494D-8FD1-326B8236BD07}"/>
+                </a:ext>
+              </a:extLst>
+            </p:cNvPr>
+            <p:cNvPicPr>
+              <a:picLocks noChangeAspect="1" noChangeArrowheads="1"/>
+            </p:cNvPicPr>
+            <p:nvPr/>
+          </p:nvPicPr>
+          <p:blipFill>
+            <a:blip r:embed="rId2">
+              <a:extLst>
+                <a:ext uri="{28A0092B-C50C-407E-A947-70E740481C1C}">
+                  <a14:useLocalDpi xmlns:a14="http://schemas.microsoft.com/office/drawing/2010/main" val="0"/>
+                </a:ext>
+              </a:extLst>
+            </a:blip>
+            <a:srcRect/>
+            <a:stretch>
+              <a:fillRect/>
+            </a:stretch>
+          </p:blipFill>
+          <p:spPr bwMode="auto">
+            <a:xfrm>
+              <a:off x="2459819" y="4472129"/>
+              <a:ext cx="8089900" cy="1484171"/>
+            </a:xfrm>
+            <a:prstGeom prst="rect">
+              <a:avLst/>
+            </a:prstGeom>
+            <a:noFill/>
+            <a:extLst>
+              <a:ext uri="{909E8E84-426E-40DD-AFC4-6F175D3DCCD1}">
+                <a14:hiddenFill xmlns:a14="http://schemas.microsoft.com/office/drawing/2010/main">
+                  <a:solidFill>
+                    <a:srgbClr val="FFFFFF"/>
+                  </a:solidFill>
+                </a14:hiddenFill>
+              </a:ext>
+            </a:extLst>
+          </p:spPr>
+        </p:pic>
+        <p:sp>
+          <p:nvSpPr>
+            <p:cNvPr id="9" name="Textfeld 8">
+              <a:extLst>
+                <a:ext uri="{FF2B5EF4-FFF2-40B4-BE49-F238E27FC236}">
+                  <a16:creationId xmlns:a16="http://schemas.microsoft.com/office/drawing/2014/main" id="{7E0814A9-09D9-41F5-9D07-D0E9B1DEE9FF}"/>
+                </a:ext>
+              </a:extLst>
+            </p:cNvPr>
+            <p:cNvSpPr txBox="1"/>
+            <p:nvPr/>
+          </p:nvSpPr>
+          <p:spPr>
+            <a:xfrm>
+              <a:off x="3066684" y="4737100"/>
+              <a:ext cx="6806223" cy="923330"/>
+            </a:xfrm>
+            <a:prstGeom prst="rect">
+              <a:avLst/>
+            </a:prstGeom>
+            <a:noFill/>
+          </p:spPr>
+          <p:txBody>
+            <a:bodyPr wrap="none" rtlCol="0">
+              <a:spAutoFit/>
+            </a:bodyPr>
+            <a:lstStyle/>
+            <a:p>
+              <a:pPr algn="ctr"/>
+              <a:r>
+                <a:rPr lang="de-DE" sz="1800" b="1" i="1" dirty="0">
+                  <a:solidFill>
+                    <a:schemeClr val="tx1"/>
+                  </a:solidFill>
+                  <a:latin typeface="Times New Roman" panose="02020603050405020304" pitchFamily="18" charset="0"/>
+                  <a:cs typeface="Times New Roman" panose="02020603050405020304" pitchFamily="18" charset="0"/>
+                </a:rPr>
+                <a:t>COLLECT ALL YELLOW ORBS AND REACH THE RED SQUARE</a:t>
+              </a:r>
+            </a:p>
+            <a:p>
+              <a:pPr algn="ctr"/>
+              <a:r>
+                <a:rPr lang="de-DE" sz="1800" b="1" i="1" dirty="0">
+                  <a:solidFill>
+                    <a:schemeClr val="tx1"/>
+                  </a:solidFill>
+                  <a:latin typeface="Times New Roman" panose="02020603050405020304" pitchFamily="18" charset="0"/>
+                  <a:cs typeface="Times New Roman" panose="02020603050405020304" pitchFamily="18" charset="0"/>
+                </a:rPr>
+                <a:t>USE THE ARROW KEYS TO PASS THIS CHALLENGE</a:t>
+              </a:r>
+            </a:p>
+            <a:p>
+              <a:endParaRPr lang="de-DE" dirty="0"/>
+            </a:p>
+          </p:txBody>
+        </p:sp>
+      </p:grpSp>
     </p:spTree>
     <p:extLst>
       <p:ext uri="{BB962C8B-B14F-4D97-AF65-F5344CB8AC3E}">

</xml_diff>

<commit_message>
prog_proj3 added enemy movement & collision, death counter and circle reset on collision
</commit_message>
<xml_diff>
--- a/prog_proj3/Prototyp_Abdel-Kader.pptx
+++ b/prog_proj3/Prototyp_Abdel-Kader.pptx
@@ -268,7 +268,7 @@
           <a:p>
             <a:fld id="{A11D1266-B88A-4790-A260-5FB966F0A26F}" type="datetimeFigureOut">
               <a:rPr lang="de-DE" smtClean="0"/>
-              <a:t>16.10.2021</a:t>
+              <a:t>23.10.2021</a:t>
             </a:fld>
             <a:endParaRPr lang="de-DE"/>
           </a:p>
@@ -466,7 +466,7 @@
           <a:p>
             <a:fld id="{A11D1266-B88A-4790-A260-5FB966F0A26F}" type="datetimeFigureOut">
               <a:rPr lang="de-DE" smtClean="0"/>
-              <a:t>16.10.2021</a:t>
+              <a:t>23.10.2021</a:t>
             </a:fld>
             <a:endParaRPr lang="de-DE"/>
           </a:p>
@@ -674,7 +674,7 @@
           <a:p>
             <a:fld id="{A11D1266-B88A-4790-A260-5FB966F0A26F}" type="datetimeFigureOut">
               <a:rPr lang="de-DE" smtClean="0"/>
-              <a:t>16.10.2021</a:t>
+              <a:t>23.10.2021</a:t>
             </a:fld>
             <a:endParaRPr lang="de-DE"/>
           </a:p>
@@ -872,7 +872,7 @@
           <a:p>
             <a:fld id="{A11D1266-B88A-4790-A260-5FB966F0A26F}" type="datetimeFigureOut">
               <a:rPr lang="de-DE" smtClean="0"/>
-              <a:t>16.10.2021</a:t>
+              <a:t>23.10.2021</a:t>
             </a:fld>
             <a:endParaRPr lang="de-DE"/>
           </a:p>
@@ -1147,7 +1147,7 @@
           <a:p>
             <a:fld id="{A11D1266-B88A-4790-A260-5FB966F0A26F}" type="datetimeFigureOut">
               <a:rPr lang="de-DE" smtClean="0"/>
-              <a:t>16.10.2021</a:t>
+              <a:t>23.10.2021</a:t>
             </a:fld>
             <a:endParaRPr lang="de-DE"/>
           </a:p>
@@ -1412,7 +1412,7 @@
           <a:p>
             <a:fld id="{A11D1266-B88A-4790-A260-5FB966F0A26F}" type="datetimeFigureOut">
               <a:rPr lang="de-DE" smtClean="0"/>
-              <a:t>16.10.2021</a:t>
+              <a:t>23.10.2021</a:t>
             </a:fld>
             <a:endParaRPr lang="de-DE"/>
           </a:p>
@@ -1824,7 +1824,7 @@
           <a:p>
             <a:fld id="{A11D1266-B88A-4790-A260-5FB966F0A26F}" type="datetimeFigureOut">
               <a:rPr lang="de-DE" smtClean="0"/>
-              <a:t>16.10.2021</a:t>
+              <a:t>23.10.2021</a:t>
             </a:fld>
             <a:endParaRPr lang="de-DE"/>
           </a:p>
@@ -1965,7 +1965,7 @@
           <a:p>
             <a:fld id="{A11D1266-B88A-4790-A260-5FB966F0A26F}" type="datetimeFigureOut">
               <a:rPr lang="de-DE" smtClean="0"/>
-              <a:t>16.10.2021</a:t>
+              <a:t>23.10.2021</a:t>
             </a:fld>
             <a:endParaRPr lang="de-DE"/>
           </a:p>
@@ -2078,7 +2078,7 @@
           <a:p>
             <a:fld id="{A11D1266-B88A-4790-A260-5FB966F0A26F}" type="datetimeFigureOut">
               <a:rPr lang="de-DE" smtClean="0"/>
-              <a:t>16.10.2021</a:t>
+              <a:t>23.10.2021</a:t>
             </a:fld>
             <a:endParaRPr lang="de-DE"/>
           </a:p>
@@ -2389,7 +2389,7 @@
           <a:p>
             <a:fld id="{A11D1266-B88A-4790-A260-5FB966F0A26F}" type="datetimeFigureOut">
               <a:rPr lang="de-DE" smtClean="0"/>
-              <a:t>16.10.2021</a:t>
+              <a:t>23.10.2021</a:t>
             </a:fld>
             <a:endParaRPr lang="de-DE"/>
           </a:p>
@@ -2677,7 +2677,7 @@
           <a:p>
             <a:fld id="{A11D1266-B88A-4790-A260-5FB966F0A26F}" type="datetimeFigureOut">
               <a:rPr lang="de-DE" smtClean="0"/>
-              <a:t>16.10.2021</a:t>
+              <a:t>23.10.2021</a:t>
             </a:fld>
             <a:endParaRPr lang="de-DE"/>
           </a:p>
@@ -2918,7 +2918,7 @@
           <a:p>
             <a:fld id="{A11D1266-B88A-4790-A260-5FB966F0A26F}" type="datetimeFigureOut">
               <a:rPr lang="de-DE" smtClean="0"/>
-              <a:t>16.10.2021</a:t>
+              <a:t>23.10.2021</a:t>
             </a:fld>
             <a:endParaRPr lang="de-DE"/>
           </a:p>

</xml_diff>